<commit_message>
Major redesign to CS61A page
</commit_message>
<xml_diff>
--- a/cs61a/discussion/disc0.pptx
+++ b/cs61a/discussion/disc0.pptx
@@ -209,7 +209,7 @@
           <a:p>
             <a:fld id="{5B6839B5-3258-C844-93B4-072815A83C68}" type="datetimeFigureOut">
               <a:rPr lang="en-US" smtClean="0"/>
-              <a:t>9/5/14</a:t>
+              <a:t>8/28/14</a:t>
             </a:fld>
             <a:endParaRPr lang="en-US"/>
           </a:p>
@@ -375,7 +375,7 @@
           <a:p>
             <a:fld id="{F5DCB199-F3D2-704F-9D22-F3F0013D2893}" type="datetimeFigureOut">
               <a:rPr lang="en-US" smtClean="0"/>
-              <a:t>9/5/14</a:t>
+              <a:t>8/28/14</a:t>
             </a:fld>
             <a:endParaRPr lang="en-US"/>
           </a:p>
@@ -3824,7 +3824,7 @@
           <a:p>
             <a:fld id="{BEAD6BA5-8076-CF4D-80F1-AC3D40560DFF}" type="datetime4">
               <a:rPr lang="en-US" smtClean="0"/>
-              <a:t>September 5, 2014</a:t>
+              <a:t>August 28, 2014</a:t>
             </a:fld>
             <a:endParaRPr lang="en-US" dirty="0"/>
           </a:p>
@@ -4110,7 +4110,7 @@
           <a:p>
             <a:fld id="{98063597-B675-6348-B82B-68A23B6BADF3}" type="datetime4">
               <a:rPr lang="en-US" smtClean="0"/>
-              <a:t>September 5, 2014</a:t>
+              <a:t>August 28, 2014</a:t>
             </a:fld>
             <a:endParaRPr lang="en-US"/>
           </a:p>
@@ -4286,7 +4286,7 @@
           <a:p>
             <a:fld id="{B2E253D7-F7CF-9C48-BD9D-2A36063AAE72}" type="datetime4">
               <a:rPr lang="en-US" smtClean="0"/>
-              <a:t>September 5, 2014</a:t>
+              <a:t>August 28, 2014</a:t>
             </a:fld>
             <a:endParaRPr lang="en-US"/>
           </a:p>
@@ -4452,7 +4452,7 @@
           <a:p>
             <a:fld id="{507B4191-A47C-B243-902B-70BBE80EE2F8}" type="datetime4">
               <a:rPr lang="en-US" smtClean="0"/>
-              <a:t>September 5, 2014</a:t>
+              <a:t>August 28, 2014</a:t>
             </a:fld>
             <a:endParaRPr lang="en-US"/>
           </a:p>
@@ -4694,7 +4694,7 @@
           <a:p>
             <a:fld id="{57160F06-03E3-DF44-A8F7-391FBAB6A5E1}" type="datetime4">
               <a:rPr lang="en-US" smtClean="0"/>
-              <a:t>September 5, 2014</a:t>
+              <a:t>August 28, 2014</a:t>
             </a:fld>
             <a:endParaRPr lang="en-US"/>
           </a:p>
@@ -4808,7 +4808,7 @@
           <a:p>
             <a:fld id="{FDA721D8-62A7-8E4C-849D-CEBFEAB2E8C1}" type="datetime4">
               <a:rPr lang="en-US" smtClean="0"/>
-              <a:t>September 5, 2014</a:t>
+              <a:t>August 28, 2014</a:t>
             </a:fld>
             <a:endParaRPr lang="en-US"/>
           </a:p>
@@ -5348,7 +5348,7 @@
           <a:p>
             <a:fld id="{416360D7-7327-DA45-92D6-777BE2003263}" type="datetime4">
               <a:rPr lang="en-US" smtClean="0"/>
-              <a:t>September 5, 2014</a:t>
+              <a:t>August 28, 2014</a:t>
             </a:fld>
             <a:endParaRPr lang="en-US"/>
           </a:p>
@@ -5462,7 +5462,7 @@
           <a:p>
             <a:fld id="{EDF41819-7160-714D-B542-D8166822A986}" type="datetime4">
               <a:rPr lang="en-US" smtClean="0"/>
-              <a:t>September 5, 2014</a:t>
+              <a:t>August 28, 2014</a:t>
             </a:fld>
             <a:endParaRPr lang="en-US"/>
           </a:p>
@@ -5553,7 +5553,7 @@
           <a:p>
             <a:fld id="{EC9F91E0-599E-3E44-9C70-144197758314}" type="datetime4">
               <a:rPr lang="en-US" smtClean="0"/>
-              <a:t>September 5, 2014</a:t>
+              <a:t>August 28, 2014</a:t>
             </a:fld>
             <a:endParaRPr lang="en-US"/>
           </a:p>
@@ -8205,7 +8205,7 @@
           <a:p>
             <a:fld id="{8DA0F384-617D-744B-AE96-DFEA0EA3F376}" type="datetime4">
               <a:rPr lang="en-US" smtClean="0"/>
-              <a:t>September 5, 2014</a:t>
+              <a:t>August 28, 2014</a:t>
             </a:fld>
             <a:endParaRPr lang="en-US"/>
           </a:p>
@@ -11418,7 +11418,7 @@
           <a:p>
             <a:fld id="{16D3EF94-A208-8846-B12C-54C31B73A306}" type="datetime4">
               <a:rPr lang="en-US" smtClean="0"/>
-              <a:t>September 5, 2014</a:t>
+              <a:t>August 28, 2014</a:t>
             </a:fld>
             <a:endParaRPr lang="en-US"/>
           </a:p>
@@ -14241,7 +14241,7 @@
           <a:p>
             <a:fld id="{492E1A4B-E303-9549-A29A-05246B4D25A6}" type="datetime4">
               <a:rPr lang="en-US" smtClean="0"/>
-              <a:t>September 5, 2014</a:t>
+              <a:t>August 28, 2014</a:t>
             </a:fld>
             <a:endParaRPr lang="en-US"/>
           </a:p>
@@ -14725,7 +14725,15 @@
           <a:p>
             <a:r>
               <a:rPr lang="en-US" dirty="0" smtClean="0"/>
-              <a:t>Welcome to CS61A Disc. 29/47 :D</a:t>
+              <a:t>Welcome to CS61A </a:t>
+            </a:r>
+            <a:r>
+              <a:rPr lang="en-US" dirty="0" smtClean="0"/>
+              <a:t>Disc.</a:t>
+            </a:r>
+            <a:r>
+              <a:rPr lang="en-US" dirty="0" smtClean="0"/>
+              <a:t> 29/47 :D</a:t>
             </a:r>
             <a:endParaRPr lang="en-US" dirty="0"/>
           </a:p>
@@ -14743,9 +14751,7 @@
         </p:nvSpPr>
         <p:spPr/>
         <p:txBody>
-          <a:bodyPr>
-            <a:normAutofit lnSpcReduction="10000"/>
-          </a:bodyPr>
+          <a:bodyPr/>
           <a:lstStyle/>
           <a:p>
             <a:r>
@@ -14758,13 +14764,7 @@
               <a:rPr lang="en-US" dirty="0" smtClean="0">
                 <a:hlinkClick r:id="rId2"/>
               </a:rPr>
-              <a:t>dickson.tsai+cs61a@</a:t>
-            </a:r>
-            <a:r>
-              <a:rPr lang="en-US" dirty="0" smtClean="0">
-                <a:hlinkClick r:id="rId2"/>
-              </a:rPr>
-              <a:t>berkeley.edu</a:t>
+              <a:t>dickson.tsai@berkeley.edu</a:t>
             </a:r>
             <a:endParaRPr lang="en-US" dirty="0" smtClean="0"/>
           </a:p>
@@ -16438,22 +16438,7 @@
                 <a:cs typeface="Avenir Book"/>
                 <a:hlinkClick r:id="rId3"/>
               </a:rPr>
-              <a:t>Ipython </a:t>
-            </a:r>
-            <a:r>
-              <a:rPr lang="en-US" dirty="0" smtClean="0">
-                <a:latin typeface="Avenir Book"/>
-                <a:cs typeface="Avenir Book"/>
-                <a:hlinkClick r:id="rId3"/>
-              </a:rPr>
-              <a:t>Notebook</a:t>
-            </a:r>
-            <a:r>
-              <a:rPr lang="en-US" dirty="0" smtClean="0">
-                <a:latin typeface="Avenir Book"/>
-                <a:cs typeface="Avenir Book"/>
-              </a:rPr>
-              <a:t> – Take notes w/ Python!</a:t>
+              <a:t>Ipython Notebook</a:t>
             </a:r>
             <a:endParaRPr lang="en-US" dirty="0" smtClean="0">
               <a:latin typeface="Avenir Book"/>
@@ -16462,19 +16447,12 @@
           </a:p>
           <a:p>
             <a:r>
-              <a:rPr lang="en-US" dirty="0" smtClean="0">
+              <a:rPr lang="en-US" dirty="0" err="1" smtClean="0">
                 <a:latin typeface="Avenir Book"/>
                 <a:cs typeface="Avenir Book"/>
                 <a:hlinkClick r:id="rId4"/>
               </a:rPr>
               <a:t>PythonTutor</a:t>
-            </a:r>
-            <a:r>
-              <a:rPr lang="en-US" dirty="0" smtClean="0">
-                <a:latin typeface="Avenir Book"/>
-                <a:cs typeface="Avenir Book"/>
-              </a:rPr>
-              <a:t> – Environment diagrams</a:t>
             </a:r>
             <a:endParaRPr lang="en-US" dirty="0" smtClean="0">
               <a:latin typeface="Avenir Book"/>
@@ -20282,57 +20260,7 @@
                 <a:latin typeface="Avenir Book"/>
                 <a:cs typeface="Avenir Book"/>
               </a:rPr>
-              <a:t>Optional </a:t>
-            </a:r>
-            <a:r>
-              <a:rPr lang="en-US" strike="sngStrike" dirty="0" smtClean="0">
-                <a:solidFill>
-                  <a:srgbClr val="4A6300"/>
-                </a:solidFill>
-                <a:latin typeface="Avenir Book"/>
-                <a:cs typeface="Avenir Book"/>
-              </a:rPr>
-              <a:t>section homework</a:t>
-            </a:r>
-            <a:r>
-              <a:rPr lang="en-US" dirty="0" smtClean="0">
-                <a:solidFill>
-                  <a:srgbClr val="4A6300"/>
-                </a:solidFill>
-                <a:latin typeface="Avenir Book"/>
-                <a:cs typeface="Avenir Book"/>
-              </a:rPr>
-              <a:t> </a:t>
-            </a:r>
-            <a:r>
-              <a:rPr lang="en-US" dirty="0" smtClean="0">
-                <a:solidFill>
-                  <a:srgbClr val="4A6300"/>
-                </a:solidFill>
-                <a:latin typeface="Avenir Book"/>
-                <a:cs typeface="Avenir Book"/>
-              </a:rPr>
-              <a:t>practice problems </a:t>
-            </a:r>
-            <a:r>
-              <a:rPr lang="en-US" strike="sngStrike" dirty="0" smtClean="0">
-                <a:solidFill>
-                  <a:srgbClr val="4A6300"/>
-                </a:solidFill>
-                <a:latin typeface="Avenir Book"/>
-                <a:cs typeface="Avenir Book"/>
-              </a:rPr>
-              <a:t>for </a:t>
-            </a:r>
-            <a:r>
-              <a:rPr lang="en-US" strike="sngStrike" dirty="0" smtClean="0">
-                <a:solidFill>
-                  <a:srgbClr val="4A6300"/>
-                </a:solidFill>
-                <a:latin typeface="Avenir Book"/>
-                <a:cs typeface="Avenir Book"/>
-              </a:rPr>
-              <a:t>participation points (stay tuned next week! A cool system will be introduced in lecture!)</a:t>
+              <a:t>Optional section homework for participation points (stay tuned next week! A cool system will be introduced in lecture!)</a:t>
             </a:r>
           </a:p>
           <a:p>

</xml_diff>